<commit_message>
Added content to the powerpoint.
</commit_message>
<xml_diff>
--- a/Magic the Gathering.pptx
+++ b/Magic the Gathering.pptx
@@ -5,22 +5,26 @@
     <p:sldMasterId id="2147483660" r:id="rId2"/>
   </p:sldMasterIdLst>
   <p:notesMasterIdLst>
-    <p:notesMasterId r:id="rId13"/>
+    <p:notesMasterId r:id="rId17"/>
   </p:notesMasterIdLst>
   <p:handoutMasterIdLst>
-    <p:handoutMasterId r:id="rId14"/>
+    <p:handoutMasterId r:id="rId18"/>
   </p:handoutMasterIdLst>
   <p:sldIdLst>
     <p:sldId id="256" r:id="rId3"/>
-    <p:sldId id="265" r:id="rId4"/>
-    <p:sldId id="266" r:id="rId5"/>
-    <p:sldId id="267" r:id="rId6"/>
-    <p:sldId id="268" r:id="rId7"/>
-    <p:sldId id="269" r:id="rId8"/>
-    <p:sldId id="270" r:id="rId9"/>
-    <p:sldId id="271" r:id="rId10"/>
-    <p:sldId id="272" r:id="rId11"/>
-    <p:sldId id="273" r:id="rId12"/>
+    <p:sldId id="275" r:id="rId4"/>
+    <p:sldId id="274" r:id="rId5"/>
+    <p:sldId id="265" r:id="rId6"/>
+    <p:sldId id="266" r:id="rId7"/>
+    <p:sldId id="267" r:id="rId8"/>
+    <p:sldId id="268" r:id="rId9"/>
+    <p:sldId id="269" r:id="rId10"/>
+    <p:sldId id="270" r:id="rId11"/>
+    <p:sldId id="271" r:id="rId12"/>
+    <p:sldId id="272" r:id="rId13"/>
+    <p:sldId id="273" r:id="rId14"/>
+    <p:sldId id="276" r:id="rId15"/>
+    <p:sldId id="277" r:id="rId16"/>
   </p:sldIdLst>
   <p:sldSz cx="12192000" cy="6858000"/>
   <p:notesSz cx="6858000" cy="9144000"/>
@@ -223,7 +227,7 @@
           <a:p>
             <a:fld id="{762B48F5-BACC-47D6-A0F7-82FBF9C6BC85}" type="datetimeFigureOut">
               <a:rPr lang="en-US"/>
-              <a:t>5/10/2016</a:t>
+              <a:t>5/12/2016</a:t>
             </a:fld>
             <a:endParaRPr/>
           </a:p>
@@ -388,7 +392,7 @@
           <a:p>
             <a:fld id="{0CB1CD00-5424-4675-AB18-2C419B060449}" type="datetimeFigureOut">
               <a:rPr lang="en-US"/>
-              <a:t>5/10/2016</a:t>
+              <a:t>5/12/2016</a:t>
             </a:fld>
             <a:endParaRPr/>
           </a:p>
@@ -929,7 +933,7 @@
           <a:p>
             <a:fld id="{78ABE3C1-DBE1-495D-B57B-2849774B866A}" type="datetimeFigureOut">
               <a:rPr lang="en-US" dirty="0"/>
-              <a:t>5/10/2016</a:t>
+              <a:t>5/12/2016</a:t>
             </a:fld>
             <a:endParaRPr lang="en-US" dirty="0"/>
           </a:p>
@@ -1440,7 +1444,7 @@
             <a:fld id="{37CC0096-1860-4642-9CD2-0079EA5E7CD1}" type="datetimeFigureOut">
               <a:rPr lang="en-US" smtClean="0"/>
               <a:pPr/>
-              <a:t>5/10/2016</a:t>
+              <a:t>5/12/2016</a:t>
             </a:fld>
             <a:endParaRPr lang="en-US"/>
           </a:p>
@@ -1778,7 +1782,7 @@
             <a:fld id="{37CC0096-1860-4642-9CD2-0079EA5E7CD1}" type="datetimeFigureOut">
               <a:rPr lang="en-US" smtClean="0"/>
               <a:pPr/>
-              <a:t>5/10/2016</a:t>
+              <a:t>5/12/2016</a:t>
             </a:fld>
             <a:endParaRPr lang="en-US"/>
           </a:p>
@@ -2185,7 +2189,7 @@
             <a:fld id="{37CC0096-1860-4642-9CD2-0079EA5E7CD1}" type="datetimeFigureOut">
               <a:rPr lang="en-US" smtClean="0"/>
               <a:pPr/>
-              <a:t>5/10/2016</a:t>
+              <a:t>5/12/2016</a:t>
             </a:fld>
             <a:endParaRPr lang="en-US"/>
           </a:p>
@@ -2755,7 +2759,7 @@
             <a:fld id="{37CC0096-1860-4642-9CD2-0079EA5E7CD1}" type="datetimeFigureOut">
               <a:rPr lang="en-US" smtClean="0"/>
               <a:pPr/>
-              <a:t>5/10/2016</a:t>
+              <a:t>5/12/2016</a:t>
             </a:fld>
             <a:endParaRPr lang="en-US"/>
           </a:p>
@@ -3438,7 +3442,7 @@
             <a:fld id="{37CC0096-1860-4642-9CD2-0079EA5E7CD1}" type="datetimeFigureOut">
               <a:rPr lang="en-US" smtClean="0"/>
               <a:pPr/>
-              <a:t>5/10/2016</a:t>
+              <a:t>5/12/2016</a:t>
             </a:fld>
             <a:endParaRPr lang="en-US"/>
           </a:p>
@@ -4353,7 +4357,7 @@
             <a:fld id="{37CC0096-1860-4642-9CD2-0079EA5E7CD1}" type="datetimeFigureOut">
               <a:rPr lang="en-US" smtClean="0"/>
               <a:pPr/>
-              <a:t>5/10/2016</a:t>
+              <a:t>5/12/2016</a:t>
             </a:fld>
             <a:endParaRPr lang="en-US"/>
           </a:p>
@@ -4667,7 +4671,7 @@
           <a:p>
             <a:fld id="{37CC0096-1860-4642-9CD2-0079EA5E7CD1}" type="datetimeFigureOut">
               <a:rPr lang="en-US" smtClean="0"/>
-              <a:t>5/10/2016</a:t>
+              <a:t>5/12/2016</a:t>
             </a:fld>
             <a:endParaRPr lang="en-US"/>
           </a:p>
@@ -4931,7 +4935,7 @@
           <a:p>
             <a:fld id="{37CC0096-1860-4642-9CD2-0079EA5E7CD1}" type="datetimeFigureOut">
               <a:rPr lang="en-US" smtClean="0"/>
-              <a:t>5/10/2016</a:t>
+              <a:t>5/12/2016</a:t>
             </a:fld>
             <a:endParaRPr lang="en-US"/>
           </a:p>
@@ -5229,7 +5233,7 @@
           <a:p>
             <a:fld id="{37CC0096-1860-4642-9CD2-0079EA5E7CD1}" type="datetimeFigureOut">
               <a:rPr lang="en-US" smtClean="0"/>
-              <a:t>5/10/2016</a:t>
+              <a:t>5/12/2016</a:t>
             </a:fld>
             <a:endParaRPr lang="en-US"/>
           </a:p>
@@ -5553,7 +5557,7 @@
           <a:p>
             <a:fld id="{37CC0096-1860-4642-9CD2-0079EA5E7CD1}" type="datetimeFigureOut">
               <a:rPr lang="en-US" smtClean="0"/>
-              <a:t>5/10/2016</a:t>
+              <a:t>5/12/2016</a:t>
             </a:fld>
             <a:endParaRPr lang="en-US"/>
           </a:p>
@@ -5942,7 +5946,7 @@
           <a:p>
             <a:fld id="{30578ACC-22D6-47C1-A373-4FD133E34F3C}" type="datetimeFigureOut">
               <a:rPr lang="en-US" dirty="0"/>
-              <a:t>5/10/2016</a:t>
+              <a:t>5/12/2016</a:t>
             </a:fld>
             <a:endParaRPr lang="en-US" dirty="0"/>
           </a:p>
@@ -6318,7 +6322,7 @@
           <a:p>
             <a:fld id="{37CC0096-1860-4642-9CD2-0079EA5E7CD1}" type="datetimeFigureOut">
               <a:rPr lang="en-US" smtClean="0"/>
-              <a:t>5/10/2016</a:t>
+              <a:t>5/12/2016</a:t>
             </a:fld>
             <a:endParaRPr lang="en-US"/>
           </a:p>
@@ -6824,7 +6828,7 @@
           <a:p>
             <a:fld id="{37CC0096-1860-4642-9CD2-0079EA5E7CD1}" type="datetimeFigureOut">
               <a:rPr lang="en-US" smtClean="0"/>
-              <a:t>5/10/2016</a:t>
+              <a:t>5/12/2016</a:t>
             </a:fld>
             <a:endParaRPr lang="en-US"/>
           </a:p>
@@ -7081,7 +7085,7 @@
           <a:p>
             <a:fld id="{37CC0096-1860-4642-9CD2-0079EA5E7CD1}" type="datetimeFigureOut">
               <a:rPr lang="en-US" smtClean="0"/>
-              <a:t>5/10/2016</a:t>
+              <a:t>5/12/2016</a:t>
             </a:fld>
             <a:endParaRPr lang="en-US"/>
           </a:p>
@@ -7244,7 +7248,7 @@
           <a:p>
             <a:fld id="{37CC0096-1860-4642-9CD2-0079EA5E7CD1}" type="datetimeFigureOut">
               <a:rPr lang="en-US" smtClean="0"/>
-              <a:t>5/10/2016</a:t>
+              <a:t>5/12/2016</a:t>
             </a:fld>
             <a:endParaRPr lang="en-US"/>
           </a:p>
@@ -7634,7 +7638,7 @@
           <a:p>
             <a:fld id="{37CC0096-1860-4642-9CD2-0079EA5E7CD1}" type="datetimeFigureOut">
               <a:rPr lang="en-US" smtClean="0"/>
-              <a:t>5/10/2016</a:t>
+              <a:t>5/12/2016</a:t>
             </a:fld>
             <a:endParaRPr lang="en-US"/>
           </a:p>
@@ -8043,7 +8047,7 @@
           <a:p>
             <a:fld id="{37CC0096-1860-4642-9CD2-0079EA5E7CD1}" type="datetimeFigureOut">
               <a:rPr lang="en-US" smtClean="0"/>
-              <a:t>5/10/2016</a:t>
+              <a:t>5/12/2016</a:t>
             </a:fld>
             <a:endParaRPr lang="en-US"/>
           </a:p>
@@ -8337,7 +8341,7 @@
             <a:fld id="{37CC0096-1860-4642-9CD2-0079EA5E7CD1}" type="datetimeFigureOut">
               <a:rPr lang="en-US" smtClean="0"/>
               <a:pPr/>
-              <a:t>5/10/2016</a:t>
+              <a:t>5/12/2016</a:t>
             </a:fld>
             <a:endParaRPr lang="en-US"/>
           </a:p>
@@ -8892,6 +8896,268 @@
           <a:p>
             <a:r>
               <a:rPr lang="en-US" dirty="0" smtClean="0"/>
+              <a:t>Description for the Card</a:t>
+            </a:r>
+            <a:endParaRPr lang="en-US" dirty="0"/>
+          </a:p>
+        </p:txBody>
+      </p:sp>
+      <p:pic>
+        <p:nvPicPr>
+          <p:cNvPr id="4" name="Content Placeholder 3"/>
+          <p:cNvPicPr>
+            <a:picLocks noGrp="1" noChangeAspect="1"/>
+          </p:cNvPicPr>
+          <p:nvPr>
+            <p:ph idx="1"/>
+          </p:nvPr>
+        </p:nvPicPr>
+        <p:blipFill rotWithShape="1">
+          <a:blip r:embed="rId2" cstate="print">
+            <a:extLst>
+              <a:ext uri="{28A0092B-C50C-407E-A947-70E740481C1C}">
+                <a14:useLocalDpi xmlns:a14="http://schemas.microsoft.com/office/drawing/2010/main" val="0"/>
+              </a:ext>
+            </a:extLst>
+          </a:blip>
+          <a:srcRect l="6646" t="59991" r="3880" b="8249"/>
+          <a:stretch/>
+        </p:blipFill>
+        <p:spPr>
+          <a:xfrm>
+            <a:off x="2438400" y="2514599"/>
+            <a:ext cx="6858000" cy="3318387"/>
+          </a:xfrm>
+        </p:spPr>
+      </p:pic>
+      <p:sp>
+        <p:nvSpPr>
+          <p:cNvPr id="5" name="Rectangle 4"/>
+          <p:cNvSpPr/>
+          <p:nvPr/>
+        </p:nvSpPr>
+        <p:spPr>
+          <a:xfrm>
+            <a:off x="2743200" y="2819400"/>
+            <a:ext cx="6172200" cy="2743200"/>
+          </a:xfrm>
+          <a:prstGeom prst="rect">
+            <a:avLst/>
+          </a:prstGeom>
+          <a:noFill/>
+          <a:ln w="57150">
+            <a:solidFill>
+              <a:srgbClr val="FF0000"/>
+            </a:solidFill>
+          </a:ln>
+        </p:spPr>
+        <p:style>
+          <a:lnRef idx="2">
+            <a:schemeClr val="accent1">
+              <a:shade val="50000"/>
+            </a:schemeClr>
+          </a:lnRef>
+          <a:fillRef idx="1">
+            <a:schemeClr val="accent1"/>
+          </a:fillRef>
+          <a:effectRef idx="0">
+            <a:schemeClr val="accent1"/>
+          </a:effectRef>
+          <a:fontRef idx="minor">
+            <a:schemeClr val="lt1"/>
+          </a:fontRef>
+        </p:style>
+        <p:txBody>
+          <a:bodyPr rtlCol="0" anchor="ctr"/>
+          <a:lstStyle/>
+          <a:p>
+            <a:pPr algn="ctr"/>
+            <a:endParaRPr lang="en-US"/>
+          </a:p>
+        </p:txBody>
+      </p:sp>
+    </p:spTree>
+    <p:extLst>
+      <p:ext uri="{BB962C8B-B14F-4D97-AF65-F5344CB8AC3E}">
+        <p14:creationId xmlns:p14="http://schemas.microsoft.com/office/powerpoint/2010/main" val="3373117449"/>
+      </p:ext>
+    </p:extLst>
+  </p:cSld>
+  <p:clrMapOvr>
+    <a:masterClrMapping/>
+  </p:clrMapOvr>
+</p:sld>
+</file>
+
+<file path=ppt/slides/slide11.xml><?xml version="1.0" encoding="utf-8"?>
+<p:sld xmlns:a="http://schemas.openxmlformats.org/drawingml/2006/main" xmlns:r="http://schemas.openxmlformats.org/officeDocument/2006/relationships" xmlns:p="http://schemas.openxmlformats.org/presentationml/2006/main">
+  <p:cSld>
+    <p:spTree>
+      <p:nvGrpSpPr>
+        <p:cNvPr id="1" name=""/>
+        <p:cNvGrpSpPr/>
+        <p:nvPr/>
+      </p:nvGrpSpPr>
+      <p:grpSpPr>
+        <a:xfrm>
+          <a:off x="0" y="0"/>
+          <a:ext cx="0" cy="0"/>
+          <a:chOff x="0" y="0"/>
+          <a:chExt cx="0" cy="0"/>
+        </a:xfrm>
+      </p:grpSpPr>
+      <p:sp>
+        <p:nvSpPr>
+          <p:cNvPr id="2" name="Title 1"/>
+          <p:cNvSpPr>
+            <a:spLocks noGrp="1"/>
+          </p:cNvSpPr>
+          <p:nvPr>
+            <p:ph type="title"/>
+          </p:nvPr>
+        </p:nvSpPr>
+        <p:spPr/>
+        <p:txBody>
+          <a:bodyPr/>
+          <a:lstStyle/>
+          <a:p>
+            <a:r>
+              <a:rPr lang="en-US" dirty="0" smtClean="0"/>
+              <a:t>Power and Toughness </a:t>
+            </a:r>
+            <a:r>
+              <a:rPr lang="en-US" dirty="0" smtClean="0"/>
+              <a:t>of </a:t>
+            </a:r>
+            <a:r>
+              <a:rPr lang="en-US" dirty="0" smtClean="0"/>
+              <a:t>the Card</a:t>
+            </a:r>
+            <a:endParaRPr lang="en-US" dirty="0"/>
+          </a:p>
+        </p:txBody>
+      </p:sp>
+      <p:pic>
+        <p:nvPicPr>
+          <p:cNvPr id="4" name="Content Placeholder 3"/>
+          <p:cNvPicPr>
+            <a:picLocks noGrp="1" noChangeAspect="1"/>
+          </p:cNvPicPr>
+          <p:nvPr>
+            <p:ph idx="1"/>
+          </p:nvPr>
+        </p:nvPicPr>
+        <p:blipFill rotWithShape="1">
+          <a:blip r:embed="rId2" cstate="print">
+            <a:extLst>
+              <a:ext uri="{28A0092B-C50C-407E-A947-70E740481C1C}">
+                <a14:useLocalDpi xmlns:a14="http://schemas.microsoft.com/office/drawing/2010/main" val="0"/>
+              </a:ext>
+            </a:extLst>
+          </a:blip>
+          <a:srcRect l="67257" t="85399"/>
+          <a:stretch/>
+        </p:blipFill>
+        <p:spPr>
+          <a:xfrm>
+            <a:off x="2997634" y="3048000"/>
+            <a:ext cx="4979234" cy="3026724"/>
+          </a:xfrm>
+        </p:spPr>
+      </p:pic>
+      <p:sp>
+        <p:nvSpPr>
+          <p:cNvPr id="5" name="Rectangle 4"/>
+          <p:cNvSpPr/>
+          <p:nvPr/>
+        </p:nvSpPr>
+        <p:spPr>
+          <a:xfrm>
+            <a:off x="4419600" y="3951762"/>
+            <a:ext cx="2286000" cy="848838"/>
+          </a:xfrm>
+          <a:prstGeom prst="rect">
+            <a:avLst/>
+          </a:prstGeom>
+          <a:noFill/>
+          <a:ln w="57150">
+            <a:solidFill>
+              <a:srgbClr val="FF0000"/>
+            </a:solidFill>
+          </a:ln>
+        </p:spPr>
+        <p:style>
+          <a:lnRef idx="2">
+            <a:schemeClr val="accent1">
+              <a:shade val="50000"/>
+            </a:schemeClr>
+          </a:lnRef>
+          <a:fillRef idx="1">
+            <a:schemeClr val="accent1"/>
+          </a:fillRef>
+          <a:effectRef idx="0">
+            <a:schemeClr val="accent1"/>
+          </a:effectRef>
+          <a:fontRef idx="minor">
+            <a:schemeClr val="lt1"/>
+          </a:fontRef>
+        </p:style>
+        <p:txBody>
+          <a:bodyPr rtlCol="0" anchor="ctr"/>
+          <a:lstStyle/>
+          <a:p>
+            <a:pPr algn="ctr"/>
+            <a:endParaRPr lang="en-US"/>
+          </a:p>
+        </p:txBody>
+      </p:sp>
+    </p:spTree>
+    <p:extLst>
+      <p:ext uri="{BB962C8B-B14F-4D97-AF65-F5344CB8AC3E}">
+        <p14:creationId xmlns:p14="http://schemas.microsoft.com/office/powerpoint/2010/main" val="1617809523"/>
+      </p:ext>
+    </p:extLst>
+  </p:cSld>
+  <p:clrMapOvr>
+    <a:masterClrMapping/>
+  </p:clrMapOvr>
+</p:sld>
+</file>
+
+<file path=ppt/slides/slide12.xml><?xml version="1.0" encoding="utf-8"?>
+<p:sld xmlns:a="http://schemas.openxmlformats.org/drawingml/2006/main" xmlns:r="http://schemas.openxmlformats.org/officeDocument/2006/relationships" xmlns:p="http://schemas.openxmlformats.org/presentationml/2006/main">
+  <p:cSld>
+    <p:spTree>
+      <p:nvGrpSpPr>
+        <p:cNvPr id="1" name=""/>
+        <p:cNvGrpSpPr/>
+        <p:nvPr/>
+      </p:nvGrpSpPr>
+      <p:grpSpPr>
+        <a:xfrm>
+          <a:off x="0" y="0"/>
+          <a:ext cx="0" cy="0"/>
+          <a:chOff x="0" y="0"/>
+          <a:chExt cx="0" cy="0"/>
+        </a:xfrm>
+      </p:grpSpPr>
+      <p:sp>
+        <p:nvSpPr>
+          <p:cNvPr id="2" name="Title 1"/>
+          <p:cNvSpPr>
+            <a:spLocks noGrp="1"/>
+          </p:cNvSpPr>
+          <p:nvPr>
+            <p:ph type="title"/>
+          </p:nvPr>
+        </p:nvSpPr>
+        <p:spPr/>
+        <p:txBody>
+          <a:bodyPr/>
+          <a:lstStyle/>
+          <a:p>
+            <a:r>
+              <a:rPr lang="en-US" dirty="0" smtClean="0"/>
               <a:t>Image for the Card</a:t>
             </a:r>
             <a:endParaRPr lang="en-US" dirty="0"/>
@@ -8926,10 +9192,200 @@
           </a:xfrm>
         </p:spPr>
       </p:pic>
+      <p:sp>
+        <p:nvSpPr>
+          <p:cNvPr id="5" name="Rectangle 4"/>
+          <p:cNvSpPr/>
+          <p:nvPr/>
+        </p:nvSpPr>
+        <p:spPr>
+          <a:xfrm>
+            <a:off x="3506050" y="2743200"/>
+            <a:ext cx="4266349" cy="3124200"/>
+          </a:xfrm>
+          <a:prstGeom prst="rect">
+            <a:avLst/>
+          </a:prstGeom>
+          <a:noFill/>
+          <a:ln w="57150">
+            <a:solidFill>
+              <a:srgbClr val="FF0000"/>
+            </a:solidFill>
+          </a:ln>
+        </p:spPr>
+        <p:style>
+          <a:lnRef idx="2">
+            <a:schemeClr val="accent1">
+              <a:shade val="50000"/>
+            </a:schemeClr>
+          </a:lnRef>
+          <a:fillRef idx="1">
+            <a:schemeClr val="accent1"/>
+          </a:fillRef>
+          <a:effectRef idx="0">
+            <a:schemeClr val="accent1"/>
+          </a:effectRef>
+          <a:fontRef idx="minor">
+            <a:schemeClr val="lt1"/>
+          </a:fontRef>
+        </p:style>
+        <p:txBody>
+          <a:bodyPr rtlCol="0" anchor="ctr"/>
+          <a:lstStyle/>
+          <a:p>
+            <a:pPr algn="ctr"/>
+            <a:endParaRPr lang="en-US"/>
+          </a:p>
+        </p:txBody>
+      </p:sp>
     </p:spTree>
     <p:extLst>
       <p:ext uri="{BB962C8B-B14F-4D97-AF65-F5344CB8AC3E}">
         <p14:creationId xmlns:p14="http://schemas.microsoft.com/office/powerpoint/2010/main" val="534328088"/>
+      </p:ext>
+    </p:extLst>
+  </p:cSld>
+  <p:clrMapOvr>
+    <a:masterClrMapping/>
+  </p:clrMapOvr>
+</p:sld>
+</file>
+
+<file path=ppt/slides/slide13.xml><?xml version="1.0" encoding="utf-8"?>
+<p:sld xmlns:a="http://schemas.openxmlformats.org/drawingml/2006/main" xmlns:r="http://schemas.openxmlformats.org/officeDocument/2006/relationships" xmlns:p="http://schemas.openxmlformats.org/presentationml/2006/main">
+  <p:cSld>
+    <p:spTree>
+      <p:nvGrpSpPr>
+        <p:cNvPr id="1" name=""/>
+        <p:cNvGrpSpPr/>
+        <p:nvPr/>
+      </p:nvGrpSpPr>
+      <p:grpSpPr>
+        <a:xfrm>
+          <a:off x="0" y="0"/>
+          <a:ext cx="0" cy="0"/>
+          <a:chOff x="0" y="0"/>
+          <a:chExt cx="0" cy="0"/>
+        </a:xfrm>
+      </p:grpSpPr>
+      <p:sp>
+        <p:nvSpPr>
+          <p:cNvPr id="2" name="Title 1"/>
+          <p:cNvSpPr>
+            <a:spLocks noGrp="1"/>
+          </p:cNvSpPr>
+          <p:nvPr>
+            <p:ph type="title"/>
+          </p:nvPr>
+        </p:nvSpPr>
+        <p:spPr/>
+        <p:txBody>
+          <a:bodyPr/>
+          <a:lstStyle/>
+          <a:p>
+            <a:r>
+              <a:rPr lang="en-US" dirty="0" smtClean="0"/>
+              <a:t>Demo</a:t>
+            </a:r>
+            <a:endParaRPr lang="en-US" dirty="0"/>
+          </a:p>
+        </p:txBody>
+      </p:sp>
+      <p:sp>
+        <p:nvSpPr>
+          <p:cNvPr id="3" name="Content Placeholder 2"/>
+          <p:cNvSpPr>
+            <a:spLocks noGrp="1"/>
+          </p:cNvSpPr>
+          <p:nvPr>
+            <p:ph idx="1"/>
+          </p:nvPr>
+        </p:nvSpPr>
+        <p:spPr/>
+        <p:txBody>
+          <a:bodyPr/>
+          <a:lstStyle/>
+          <a:p>
+            <a:endParaRPr lang="en-US"/>
+          </a:p>
+        </p:txBody>
+      </p:sp>
+    </p:spTree>
+    <p:extLst>
+      <p:ext uri="{BB962C8B-B14F-4D97-AF65-F5344CB8AC3E}">
+        <p14:creationId xmlns:p14="http://schemas.microsoft.com/office/powerpoint/2010/main" val="2051462922"/>
+      </p:ext>
+    </p:extLst>
+  </p:cSld>
+  <p:clrMapOvr>
+    <a:masterClrMapping/>
+  </p:clrMapOvr>
+</p:sld>
+</file>
+
+<file path=ppt/slides/slide14.xml><?xml version="1.0" encoding="utf-8"?>
+<p:sld xmlns:a="http://schemas.openxmlformats.org/drawingml/2006/main" xmlns:r="http://schemas.openxmlformats.org/officeDocument/2006/relationships" xmlns:p="http://schemas.openxmlformats.org/presentationml/2006/main">
+  <p:cSld>
+    <p:spTree>
+      <p:nvGrpSpPr>
+        <p:cNvPr id="1" name=""/>
+        <p:cNvGrpSpPr/>
+        <p:nvPr/>
+      </p:nvGrpSpPr>
+      <p:grpSpPr>
+        <a:xfrm>
+          <a:off x="0" y="0"/>
+          <a:ext cx="0" cy="0"/>
+          <a:chOff x="0" y="0"/>
+          <a:chExt cx="0" cy="0"/>
+        </a:xfrm>
+      </p:grpSpPr>
+      <p:sp>
+        <p:nvSpPr>
+          <p:cNvPr id="2" name="Title 1"/>
+          <p:cNvSpPr>
+            <a:spLocks noGrp="1"/>
+          </p:cNvSpPr>
+          <p:nvPr>
+            <p:ph type="title"/>
+          </p:nvPr>
+        </p:nvSpPr>
+        <p:spPr/>
+        <p:txBody>
+          <a:bodyPr/>
+          <a:lstStyle/>
+          <a:p>
+            <a:r>
+              <a:rPr lang="en-US" dirty="0" smtClean="0"/>
+              <a:t>Questions</a:t>
+            </a:r>
+            <a:endParaRPr lang="en-US" dirty="0"/>
+          </a:p>
+        </p:txBody>
+      </p:sp>
+      <p:sp>
+        <p:nvSpPr>
+          <p:cNvPr id="3" name="Content Placeholder 2"/>
+          <p:cNvSpPr>
+            <a:spLocks noGrp="1"/>
+          </p:cNvSpPr>
+          <p:nvPr>
+            <p:ph idx="1"/>
+          </p:nvPr>
+        </p:nvSpPr>
+        <p:spPr/>
+        <p:txBody>
+          <a:bodyPr/>
+          <a:lstStyle/>
+          <a:p>
+            <a:endParaRPr lang="en-US"/>
+          </a:p>
+        </p:txBody>
+      </p:sp>
+    </p:spTree>
+    <p:extLst>
+      <p:ext uri="{BB962C8B-B14F-4D97-AF65-F5344CB8AC3E}">
+        <p14:creationId xmlns:p14="http://schemas.microsoft.com/office/powerpoint/2010/main" val="3262303070"/>
       </p:ext>
     </p:extLst>
   </p:cSld>
@@ -8958,7 +9414,7 @@
       </p:grpSpPr>
       <p:sp>
         <p:nvSpPr>
-          <p:cNvPr id="13" name="Title 12"/>
+          <p:cNvPr id="2" name="Title 1"/>
           <p:cNvSpPr>
             <a:spLocks noGrp="1"/>
           </p:cNvSpPr>
@@ -8973,15 +9429,15 @@
           <a:p>
             <a:r>
               <a:rPr lang="en-US" dirty="0" smtClean="0"/>
-              <a:t>What is Magic the Gathering</a:t>
-            </a:r>
-            <a:endParaRPr dirty="0"/>
-          </a:p>
-        </p:txBody>
-      </p:sp>
-      <p:sp>
-        <p:nvSpPr>
-          <p:cNvPr id="14" name="Content Placeholder 13"/>
+              <a:t>Goals</a:t>
+            </a:r>
+            <a:endParaRPr lang="en-US" dirty="0"/>
+          </a:p>
+        </p:txBody>
+      </p:sp>
+      <p:sp>
+        <p:nvSpPr>
+          <p:cNvPr id="3" name="Content Placeholder 2"/>
           <p:cNvSpPr>
             <a:spLocks noGrp="1"/>
           </p:cNvSpPr>
@@ -8989,13 +9445,306 @@
             <p:ph idx="1"/>
           </p:nvPr>
         </p:nvSpPr>
-        <p:spPr/>
+        <p:spPr>
+          <a:xfrm>
+            <a:off x="680321" y="2336872"/>
+            <a:ext cx="9613861" cy="4140127"/>
+          </a:xfrm>
+        </p:spPr>
         <p:txBody>
           <a:bodyPr/>
           <a:lstStyle/>
           <a:p>
             <a:r>
               <a:rPr lang="en-US" dirty="0" smtClean="0"/>
+              <a:t>Write a program that identifies a card from Magic: The Gathering based on a picture of it</a:t>
+            </a:r>
+          </a:p>
+          <a:p>
+            <a:endParaRPr lang="en-US" dirty="0" smtClean="0"/>
+          </a:p>
+          <a:p>
+            <a:r>
+              <a:rPr lang="en-US" dirty="0"/>
+              <a:t>Not particularly concerned with front-end usability</a:t>
+            </a:r>
+          </a:p>
+          <a:p>
+            <a:pPr lvl="1"/>
+            <a:r>
+              <a:rPr lang="en-US" dirty="0"/>
+              <a:t>Envisioned as a back-end, cloud-hosted component of a mobile </a:t>
+            </a:r>
+            <a:r>
+              <a:rPr lang="en-US" dirty="0" smtClean="0"/>
+              <a:t>app</a:t>
+            </a:r>
+          </a:p>
+          <a:p>
+            <a:pPr lvl="1"/>
+            <a:endParaRPr lang="en-US" dirty="0"/>
+          </a:p>
+          <a:p>
+            <a:pPr marL="228600" lvl="1">
+              <a:spcBef>
+                <a:spcPts val="1000"/>
+              </a:spcBef>
+            </a:pPr>
+            <a:r>
+              <a:rPr lang="en-US" sz="2400" dirty="0"/>
+              <a:t>Could be tied into </a:t>
+            </a:r>
+            <a:r>
+              <a:rPr lang="en-US" sz="2400" dirty="0" smtClean="0"/>
+              <a:t>external </a:t>
+            </a:r>
+            <a:r>
+              <a:rPr lang="en-US" sz="2400" dirty="0"/>
+              <a:t>databases/APIs to fetch </a:t>
+            </a:r>
+            <a:r>
+              <a:rPr lang="en-US" sz="2400" dirty="0" smtClean="0"/>
+              <a:t>useful data</a:t>
+            </a:r>
+          </a:p>
+          <a:p>
+            <a:pPr marL="685800" lvl="2">
+              <a:spcBef>
+                <a:spcPts val="1000"/>
+              </a:spcBef>
+            </a:pPr>
+            <a:r>
+              <a:rPr lang="en-US" sz="2200" dirty="0" smtClean="0"/>
+              <a:t>Pricing information</a:t>
+            </a:r>
+          </a:p>
+          <a:p>
+            <a:pPr marL="685800" lvl="2">
+              <a:spcBef>
+                <a:spcPts val="1000"/>
+              </a:spcBef>
+            </a:pPr>
+            <a:r>
+              <a:rPr lang="en-US" sz="2200" dirty="0" smtClean="0"/>
+              <a:t>Rules clarification</a:t>
+            </a:r>
+          </a:p>
+          <a:p>
+            <a:pPr marL="685800" lvl="2">
+              <a:spcBef>
+                <a:spcPts val="1000"/>
+              </a:spcBef>
+            </a:pPr>
+            <a:endParaRPr lang="en-US" sz="2200" dirty="0" smtClean="0"/>
+          </a:p>
+          <a:p>
+            <a:pPr marL="685800" lvl="2">
+              <a:spcBef>
+                <a:spcPts val="1000"/>
+              </a:spcBef>
+            </a:pPr>
+            <a:endParaRPr lang="en-US" sz="2200" dirty="0"/>
+          </a:p>
+          <a:p>
+            <a:endParaRPr lang="en-US" dirty="0" smtClean="0"/>
+          </a:p>
+        </p:txBody>
+      </p:sp>
+    </p:spTree>
+    <p:extLst>
+      <p:ext uri="{BB962C8B-B14F-4D97-AF65-F5344CB8AC3E}">
+        <p14:creationId xmlns:p14="http://schemas.microsoft.com/office/powerpoint/2010/main" val="378103922"/>
+      </p:ext>
+    </p:extLst>
+  </p:cSld>
+  <p:clrMapOvr>
+    <a:masterClrMapping/>
+  </p:clrMapOvr>
+</p:sld>
+</file>
+
+<file path=ppt/slides/slide3.xml><?xml version="1.0" encoding="utf-8"?>
+<p:sld xmlns:a="http://schemas.openxmlformats.org/drawingml/2006/main" xmlns:r="http://schemas.openxmlformats.org/officeDocument/2006/relationships" xmlns:p="http://schemas.openxmlformats.org/presentationml/2006/main">
+  <p:cSld>
+    <p:spTree>
+      <p:nvGrpSpPr>
+        <p:cNvPr id="1" name=""/>
+        <p:cNvGrpSpPr/>
+        <p:nvPr/>
+      </p:nvGrpSpPr>
+      <p:grpSpPr>
+        <a:xfrm>
+          <a:off x="0" y="0"/>
+          <a:ext cx="0" cy="0"/>
+          <a:chOff x="0" y="0"/>
+          <a:chExt cx="0" cy="0"/>
+        </a:xfrm>
+      </p:grpSpPr>
+      <p:sp>
+        <p:nvSpPr>
+          <p:cNvPr id="2" name="Title 1"/>
+          <p:cNvSpPr>
+            <a:spLocks noGrp="1"/>
+          </p:cNvSpPr>
+          <p:nvPr>
+            <p:ph type="title"/>
+          </p:nvPr>
+        </p:nvSpPr>
+        <p:spPr/>
+        <p:txBody>
+          <a:bodyPr/>
+          <a:lstStyle/>
+          <a:p>
+            <a:r>
+              <a:rPr lang="en-US" dirty="0" smtClean="0"/>
+              <a:t>Plans</a:t>
+            </a:r>
+            <a:endParaRPr lang="en-US" dirty="0"/>
+          </a:p>
+        </p:txBody>
+      </p:sp>
+      <p:sp>
+        <p:nvSpPr>
+          <p:cNvPr id="3" name="Content Placeholder 2"/>
+          <p:cNvSpPr>
+            <a:spLocks noGrp="1"/>
+          </p:cNvSpPr>
+          <p:nvPr>
+            <p:ph idx="1"/>
+          </p:nvPr>
+        </p:nvSpPr>
+        <p:spPr/>
+        <p:txBody>
+          <a:bodyPr/>
+          <a:lstStyle/>
+          <a:p>
+            <a:r>
+              <a:rPr lang="en-US" dirty="0" smtClean="0"/>
+              <a:t>Initially we considered using external libraries</a:t>
+            </a:r>
+          </a:p>
+          <a:p>
+            <a:pPr lvl="1"/>
+            <a:r>
+              <a:rPr lang="en-US" dirty="0"/>
+              <a:t>Processing’s version of </a:t>
+            </a:r>
+            <a:r>
+              <a:rPr lang="en-US" dirty="0" err="1" smtClean="0"/>
+              <a:t>OpenCV</a:t>
+            </a:r>
+            <a:endParaRPr lang="en-US" dirty="0" smtClean="0"/>
+          </a:p>
+          <a:p>
+            <a:pPr lvl="1"/>
+            <a:endParaRPr lang="en-US" dirty="0"/>
+          </a:p>
+          <a:p>
+            <a:r>
+              <a:rPr lang="en-US" dirty="0" smtClean="0"/>
+              <a:t>Ultimately decided to write it all in Processing ourselves.</a:t>
+            </a:r>
+          </a:p>
+          <a:p>
+            <a:endParaRPr lang="en-US" dirty="0" smtClean="0"/>
+          </a:p>
+          <a:p>
+            <a:pPr marL="457200" lvl="1" indent="0">
+              <a:buNone/>
+            </a:pPr>
+            <a:r>
+              <a:rPr lang="en-US" dirty="0" smtClean="0"/>
+              <a:t/>
+            </a:r>
+            <a:br>
+              <a:rPr lang="en-US" dirty="0" smtClean="0"/>
+            </a:br>
+            <a:endParaRPr lang="en-US" dirty="0" smtClean="0"/>
+          </a:p>
+        </p:txBody>
+      </p:sp>
+    </p:spTree>
+    <p:extLst>
+      <p:ext uri="{BB962C8B-B14F-4D97-AF65-F5344CB8AC3E}">
+        <p14:creationId xmlns:p14="http://schemas.microsoft.com/office/powerpoint/2010/main" val="2846614694"/>
+      </p:ext>
+    </p:extLst>
+  </p:cSld>
+  <p:clrMapOvr>
+    <a:masterClrMapping/>
+  </p:clrMapOvr>
+</p:sld>
+</file>
+
+<file path=ppt/slides/slide4.xml><?xml version="1.0" encoding="utf-8"?>
+<p:sld xmlns:a="http://schemas.openxmlformats.org/drawingml/2006/main" xmlns:r="http://schemas.openxmlformats.org/officeDocument/2006/relationships" xmlns:p="http://schemas.openxmlformats.org/presentationml/2006/main">
+  <p:cSld>
+    <p:spTree>
+      <p:nvGrpSpPr>
+        <p:cNvPr id="1" name=""/>
+        <p:cNvGrpSpPr/>
+        <p:nvPr/>
+      </p:nvGrpSpPr>
+      <p:grpSpPr>
+        <a:xfrm>
+          <a:off x="0" y="0"/>
+          <a:ext cx="0" cy="0"/>
+          <a:chOff x="0" y="0"/>
+          <a:chExt cx="0" cy="0"/>
+        </a:xfrm>
+      </p:grpSpPr>
+      <p:sp>
+        <p:nvSpPr>
+          <p:cNvPr id="13" name="Title 12"/>
+          <p:cNvSpPr>
+            <a:spLocks noGrp="1"/>
+          </p:cNvSpPr>
+          <p:nvPr>
+            <p:ph type="title"/>
+          </p:nvPr>
+        </p:nvSpPr>
+        <p:spPr/>
+        <p:txBody>
+          <a:bodyPr/>
+          <a:lstStyle/>
+          <a:p>
+            <a:r>
+              <a:rPr lang="en-US" dirty="0" smtClean="0"/>
+              <a:t>What is </a:t>
+            </a:r>
+            <a:r>
+              <a:rPr lang="en-US" dirty="0" smtClean="0"/>
+              <a:t>Magic: </a:t>
+            </a:r>
+            <a:r>
+              <a:rPr lang="en-US" dirty="0" smtClean="0"/>
+              <a:t>the </a:t>
+            </a:r>
+            <a:r>
+              <a:rPr lang="en-US" dirty="0" smtClean="0"/>
+              <a:t>Gathering?</a:t>
+            </a:r>
+            <a:endParaRPr dirty="0"/>
+          </a:p>
+        </p:txBody>
+      </p:sp>
+      <p:sp>
+        <p:nvSpPr>
+          <p:cNvPr id="14" name="Content Placeholder 13"/>
+          <p:cNvSpPr>
+            <a:spLocks noGrp="1"/>
+          </p:cNvSpPr>
+          <p:nvPr>
+            <p:ph idx="1"/>
+          </p:nvPr>
+        </p:nvSpPr>
+        <p:spPr/>
+        <p:txBody>
+          <a:bodyPr/>
+          <a:lstStyle/>
+          <a:p>
+            <a:r>
+              <a:rPr lang="en-US" dirty="0" smtClean="0"/>
               <a:t>Magic is a trading card game</a:t>
             </a:r>
             <a:endParaRPr dirty="0"/>
@@ -9010,7 +9759,18 @@
           <a:p>
             <a:r>
               <a:rPr lang="en-US" dirty="0" smtClean="0"/>
-              <a:t>One of the most popular trading card games in the world</a:t>
+              <a:t>One of the most popular trading card games in the </a:t>
+            </a:r>
+            <a:r>
+              <a:rPr lang="en-US" dirty="0" smtClean="0"/>
+              <a:t>world</a:t>
+            </a:r>
+          </a:p>
+          <a:p>
+            <a:pPr lvl="1"/>
+            <a:r>
+              <a:rPr lang="en-US" dirty="0" smtClean="0"/>
+              <a:t>Over 10,000 unique cards exist!</a:t>
             </a:r>
             <a:endParaRPr dirty="0"/>
           </a:p>
@@ -9044,199 +9804,6 @@
 </p:sld>
 </file>
 
-<file path=ppt/slides/slide3.xml><?xml version="1.0" encoding="utf-8"?>
-<p:sld xmlns:a="http://schemas.openxmlformats.org/drawingml/2006/main" xmlns:r="http://schemas.openxmlformats.org/officeDocument/2006/relationships" xmlns:p="http://schemas.openxmlformats.org/presentationml/2006/main">
-  <p:cSld>
-    <p:spTree>
-      <p:nvGrpSpPr>
-        <p:cNvPr id="1" name=""/>
-        <p:cNvGrpSpPr/>
-        <p:nvPr/>
-      </p:nvGrpSpPr>
-      <p:grpSpPr>
-        <a:xfrm>
-          <a:off x="0" y="0"/>
-          <a:ext cx="0" cy="0"/>
-          <a:chOff x="0" y="0"/>
-          <a:chExt cx="0" cy="0"/>
-        </a:xfrm>
-      </p:grpSpPr>
-      <p:sp>
-        <p:nvSpPr>
-          <p:cNvPr id="2" name="Title 1"/>
-          <p:cNvSpPr>
-            <a:spLocks noGrp="1"/>
-          </p:cNvSpPr>
-          <p:nvPr>
-            <p:ph type="title"/>
-          </p:nvPr>
-        </p:nvSpPr>
-        <p:spPr/>
-        <p:txBody>
-          <a:bodyPr/>
-          <a:lstStyle/>
-          <a:p>
-            <a:r>
-              <a:rPr lang="en-US" dirty="0" smtClean="0"/>
-              <a:t>Magic the Gathering Cards</a:t>
-            </a:r>
-            <a:endParaRPr lang="en-US" dirty="0"/>
-          </a:p>
-        </p:txBody>
-      </p:sp>
-      <p:pic>
-        <p:nvPicPr>
-          <p:cNvPr id="4" name="Content Placeholder 3"/>
-          <p:cNvPicPr>
-            <a:picLocks noGrp="1" noChangeAspect="1"/>
-          </p:cNvPicPr>
-          <p:nvPr>
-            <p:ph idx="1"/>
-          </p:nvPr>
-        </p:nvPicPr>
-        <p:blipFill>
-          <a:blip r:embed="rId2">
-            <a:extLst>
-              <a:ext uri="{28A0092B-C50C-407E-A947-70E740481C1C}">
-                <a14:useLocalDpi xmlns:a14="http://schemas.microsoft.com/office/drawing/2010/main" val="0"/>
-              </a:ext>
-            </a:extLst>
-          </a:blip>
-          <a:stretch>
-            <a:fillRect/>
-          </a:stretch>
-        </p:blipFill>
-        <p:spPr>
-          <a:xfrm>
-            <a:off x="2057400" y="2209800"/>
-            <a:ext cx="3200400" cy="4461575"/>
-          </a:xfrm>
-        </p:spPr>
-      </p:pic>
-      <p:pic>
-        <p:nvPicPr>
-          <p:cNvPr id="5" name="Picture 4"/>
-          <p:cNvPicPr>
-            <a:picLocks noChangeAspect="1"/>
-          </p:cNvPicPr>
-          <p:nvPr/>
-        </p:nvPicPr>
-        <p:blipFill>
-          <a:blip r:embed="rId3">
-            <a:extLst>
-              <a:ext uri="{28A0092B-C50C-407E-A947-70E740481C1C}">
-                <a14:useLocalDpi xmlns:a14="http://schemas.microsoft.com/office/drawing/2010/main" val="0"/>
-              </a:ext>
-            </a:extLst>
-          </a:blip>
-          <a:stretch>
-            <a:fillRect/>
-          </a:stretch>
-        </p:blipFill>
-        <p:spPr>
-          <a:xfrm>
-            <a:off x="7016699" y="2203648"/>
-            <a:ext cx="3277483" cy="4467727"/>
-          </a:xfrm>
-          <a:prstGeom prst="rect">
-            <a:avLst/>
-          </a:prstGeom>
-        </p:spPr>
-      </p:pic>
-    </p:spTree>
-    <p:extLst>
-      <p:ext uri="{BB962C8B-B14F-4D97-AF65-F5344CB8AC3E}">
-        <p14:creationId xmlns:p14="http://schemas.microsoft.com/office/powerpoint/2010/main" val="216331451"/>
-      </p:ext>
-    </p:extLst>
-  </p:cSld>
-  <p:clrMapOvr>
-    <a:masterClrMapping/>
-  </p:clrMapOvr>
-</p:sld>
-</file>
-
-<file path=ppt/slides/slide4.xml><?xml version="1.0" encoding="utf-8"?>
-<p:sld xmlns:a="http://schemas.openxmlformats.org/drawingml/2006/main" xmlns:r="http://schemas.openxmlformats.org/officeDocument/2006/relationships" xmlns:p="http://schemas.openxmlformats.org/presentationml/2006/main">
-  <p:cSld>
-    <p:spTree>
-      <p:nvGrpSpPr>
-        <p:cNvPr id="1" name=""/>
-        <p:cNvGrpSpPr/>
-        <p:nvPr/>
-      </p:nvGrpSpPr>
-      <p:grpSpPr>
-        <a:xfrm>
-          <a:off x="0" y="0"/>
-          <a:ext cx="0" cy="0"/>
-          <a:chOff x="0" y="0"/>
-          <a:chExt cx="0" cy="0"/>
-        </a:xfrm>
-      </p:grpSpPr>
-      <p:sp>
-        <p:nvSpPr>
-          <p:cNvPr id="2" name="Title 1"/>
-          <p:cNvSpPr>
-            <a:spLocks noGrp="1"/>
-          </p:cNvSpPr>
-          <p:nvPr>
-            <p:ph type="title"/>
-          </p:nvPr>
-        </p:nvSpPr>
-        <p:spPr/>
-        <p:txBody>
-          <a:bodyPr/>
-          <a:lstStyle/>
-          <a:p>
-            <a:r>
-              <a:rPr lang="en-US" dirty="0" smtClean="0"/>
-              <a:t>Name of the card</a:t>
-            </a:r>
-            <a:endParaRPr lang="en-US" dirty="0"/>
-          </a:p>
-        </p:txBody>
-      </p:sp>
-      <p:pic>
-        <p:nvPicPr>
-          <p:cNvPr id="4" name="Content Placeholder 3"/>
-          <p:cNvPicPr>
-            <a:picLocks noGrp="1" noChangeAspect="1"/>
-          </p:cNvPicPr>
-          <p:nvPr>
-            <p:ph idx="1"/>
-          </p:nvPr>
-        </p:nvPicPr>
-        <p:blipFill rotWithShape="1">
-          <a:blip r:embed="rId2" cstate="print">
-            <a:extLst>
-              <a:ext uri="{28A0092B-C50C-407E-A947-70E740481C1C}">
-                <a14:useLocalDpi xmlns:a14="http://schemas.microsoft.com/office/drawing/2010/main" val="0"/>
-              </a:ext>
-            </a:extLst>
-          </a:blip>
-          <a:srcRect t="1" r="27735" b="66350"/>
-          <a:stretch/>
-        </p:blipFill>
-        <p:spPr>
-          <a:xfrm>
-            <a:off x="2819400" y="2286000"/>
-            <a:ext cx="6400800" cy="4062883"/>
-          </a:xfrm>
-        </p:spPr>
-      </p:pic>
-    </p:spTree>
-    <p:extLst>
-      <p:ext uri="{BB962C8B-B14F-4D97-AF65-F5344CB8AC3E}">
-        <p14:creationId xmlns:p14="http://schemas.microsoft.com/office/powerpoint/2010/main" val="3152287720"/>
-      </p:ext>
-    </p:extLst>
-  </p:cSld>
-  <p:clrMapOvr>
-    <a:masterClrMapping/>
-  </p:clrMapOvr>
-</p:sld>
-</file>
-
 <file path=ppt/slides/slide5.xml><?xml version="1.0" encoding="utf-8"?>
 <p:sld xmlns:a="http://schemas.openxmlformats.org/drawingml/2006/main" xmlns:r="http://schemas.openxmlformats.org/officeDocument/2006/relationships" xmlns:p="http://schemas.openxmlformats.org/presentationml/2006/main">
   <p:cSld>
@@ -9271,7 +9838,7 @@
           <a:p>
             <a:r>
               <a:rPr lang="en-US" dirty="0" smtClean="0"/>
-              <a:t>Cost of the Card</a:t>
+              <a:t>Magic the Gathering Cards</a:t>
             </a:r>
             <a:endParaRPr lang="en-US" dirty="0"/>
           </a:p>
@@ -9287,28 +9854,58 @@
             <p:ph idx="1"/>
           </p:nvPr>
         </p:nvPicPr>
-        <p:blipFill rotWithShape="1">
-          <a:blip r:embed="rId2" cstate="print">
+        <p:blipFill>
+          <a:blip r:embed="rId2">
             <a:extLst>
               <a:ext uri="{28A0092B-C50C-407E-A947-70E740481C1C}">
                 <a14:useLocalDpi xmlns:a14="http://schemas.microsoft.com/office/drawing/2010/main" val="0"/>
               </a:ext>
             </a:extLst>
           </a:blip>
-          <a:srcRect l="58599" b="69652"/>
+          <a:stretch>
+            <a:fillRect/>
+          </a:stretch>
+        </p:blipFill>
+        <p:spPr>
+          <a:xfrm>
+            <a:off x="2057400" y="2209800"/>
+            <a:ext cx="3200400" cy="4461575"/>
+          </a:xfrm>
+        </p:spPr>
+      </p:pic>
+      <p:pic>
+        <p:nvPicPr>
+          <p:cNvPr id="5" name="Picture 4"/>
+          <p:cNvPicPr>
+            <a:picLocks noChangeAspect="1"/>
+          </p:cNvPicPr>
+          <p:nvPr/>
+        </p:nvPicPr>
+        <p:blipFill rotWithShape="1">
+          <a:blip r:embed="rId3">
+            <a:extLst>
+              <a:ext uri="{28A0092B-C50C-407E-A947-70E740481C1C}">
+                <a14:useLocalDpi xmlns:a14="http://schemas.microsoft.com/office/drawing/2010/main" val="0"/>
+              </a:ext>
+            </a:extLst>
+          </a:blip>
+          <a:srcRect l="2133" r="-1" b="939"/>
           <a:stretch/>
         </p:blipFill>
         <p:spPr>
           <a:xfrm>
-            <a:off x="3200400" y="2286000"/>
-            <a:ext cx="4191000" cy="4187802"/>
-          </a:xfrm>
+            <a:off x="7086600" y="2203649"/>
+            <a:ext cx="3207582" cy="4425751"/>
+          </a:xfrm>
+          <a:prstGeom prst="rect">
+            <a:avLst/>
+          </a:prstGeom>
         </p:spPr>
       </p:pic>
     </p:spTree>
     <p:extLst>
       <p:ext uri="{BB962C8B-B14F-4D97-AF65-F5344CB8AC3E}">
-        <p14:creationId xmlns:p14="http://schemas.microsoft.com/office/powerpoint/2010/main" val="33994053"/>
+        <p14:creationId xmlns:p14="http://schemas.microsoft.com/office/powerpoint/2010/main" val="216331451"/>
       </p:ext>
     </p:extLst>
   </p:cSld>
@@ -9352,7 +9949,7 @@
           <a:p>
             <a:r>
               <a:rPr lang="en-US" dirty="0" smtClean="0"/>
-              <a:t>Type of the Card</a:t>
+              <a:t>Name of the card</a:t>
             </a:r>
             <a:endParaRPr lang="en-US" dirty="0"/>
           </a:p>
@@ -9376,20 +9973,66 @@
               </a:ext>
             </a:extLst>
           </a:blip>
-          <a:srcRect l="5773" t="48699" r="27843" b="32245"/>
+          <a:srcRect l="2581" t="1" r="27735" b="66350"/>
           <a:stretch/>
         </p:blipFill>
         <p:spPr>
           <a:xfrm>
-            <a:off x="2819400" y="3200400"/>
-            <a:ext cx="7010400" cy="2743204"/>
+            <a:off x="3048000" y="2286000"/>
+            <a:ext cx="6172200" cy="4062883"/>
           </a:xfrm>
         </p:spPr>
       </p:pic>
+      <p:sp>
+        <p:nvSpPr>
+          <p:cNvPr id="3" name="Rectangle 2"/>
+          <p:cNvSpPr/>
+          <p:nvPr/>
+        </p:nvSpPr>
+        <p:spPr>
+          <a:xfrm>
+            <a:off x="3657600" y="2895600"/>
+            <a:ext cx="3962400" cy="609600"/>
+          </a:xfrm>
+          <a:prstGeom prst="rect">
+            <a:avLst/>
+          </a:prstGeom>
+          <a:noFill/>
+          <a:ln w="57150">
+            <a:solidFill>
+              <a:srgbClr val="FF0000"/>
+            </a:solidFill>
+          </a:ln>
+        </p:spPr>
+        <p:style>
+          <a:lnRef idx="2">
+            <a:schemeClr val="accent1">
+              <a:shade val="50000"/>
+            </a:schemeClr>
+          </a:lnRef>
+          <a:fillRef idx="1">
+            <a:schemeClr val="accent1"/>
+          </a:fillRef>
+          <a:effectRef idx="0">
+            <a:schemeClr val="accent1"/>
+          </a:effectRef>
+          <a:fontRef idx="minor">
+            <a:schemeClr val="lt1"/>
+          </a:fontRef>
+        </p:style>
+        <p:txBody>
+          <a:bodyPr rtlCol="0" anchor="ctr"/>
+          <a:lstStyle/>
+          <a:p>
+            <a:pPr algn="ctr"/>
+            <a:endParaRPr lang="en-US"/>
+          </a:p>
+        </p:txBody>
+      </p:sp>
     </p:spTree>
     <p:extLst>
       <p:ext uri="{BB962C8B-B14F-4D97-AF65-F5344CB8AC3E}">
-        <p14:creationId xmlns:p14="http://schemas.microsoft.com/office/powerpoint/2010/main" val="14985521"/>
+        <p14:creationId xmlns:p14="http://schemas.microsoft.com/office/powerpoint/2010/main" val="3152287720"/>
       </p:ext>
     </p:extLst>
   </p:cSld>
@@ -9433,7 +10076,7 @@
           <a:p>
             <a:r>
               <a:rPr lang="en-US" dirty="0" smtClean="0"/>
-              <a:t>Set and Rarity of the Card</a:t>
+              <a:t>Cost of the Card</a:t>
             </a:r>
             <a:endParaRPr lang="en-US" dirty="0"/>
           </a:p>
@@ -9457,20 +10100,66 @@
               </a:ext>
             </a:extLst>
           </a:blip>
-          <a:srcRect l="75916" t="49404" b="33657"/>
+          <a:srcRect l="58599" b="69652"/>
           <a:stretch/>
         </p:blipFill>
         <p:spPr>
           <a:xfrm>
-            <a:off x="3733800" y="2575080"/>
-            <a:ext cx="4038600" cy="3871977"/>
+            <a:off x="3200400" y="2286000"/>
+            <a:ext cx="4191000" cy="4187802"/>
           </a:xfrm>
         </p:spPr>
       </p:pic>
+      <p:sp>
+        <p:nvSpPr>
+          <p:cNvPr id="5" name="Rectangle 4"/>
+          <p:cNvSpPr/>
+          <p:nvPr/>
+        </p:nvSpPr>
+        <p:spPr>
+          <a:xfrm>
+            <a:off x="3276600" y="3048000"/>
+            <a:ext cx="3352800" cy="685800"/>
+          </a:xfrm>
+          <a:prstGeom prst="rect">
+            <a:avLst/>
+          </a:prstGeom>
+          <a:noFill/>
+          <a:ln w="57150">
+            <a:solidFill>
+              <a:srgbClr val="FF0000"/>
+            </a:solidFill>
+          </a:ln>
+        </p:spPr>
+        <p:style>
+          <a:lnRef idx="2">
+            <a:schemeClr val="accent1">
+              <a:shade val="50000"/>
+            </a:schemeClr>
+          </a:lnRef>
+          <a:fillRef idx="1">
+            <a:schemeClr val="accent1"/>
+          </a:fillRef>
+          <a:effectRef idx="0">
+            <a:schemeClr val="accent1"/>
+          </a:effectRef>
+          <a:fontRef idx="minor">
+            <a:schemeClr val="lt1"/>
+          </a:fontRef>
+        </p:style>
+        <p:txBody>
+          <a:bodyPr rtlCol="0" anchor="ctr"/>
+          <a:lstStyle/>
+          <a:p>
+            <a:pPr algn="ctr"/>
+            <a:endParaRPr lang="en-US"/>
+          </a:p>
+        </p:txBody>
+      </p:sp>
     </p:spTree>
     <p:extLst>
       <p:ext uri="{BB962C8B-B14F-4D97-AF65-F5344CB8AC3E}">
-        <p14:creationId xmlns:p14="http://schemas.microsoft.com/office/powerpoint/2010/main" val="1965856906"/>
+        <p14:creationId xmlns:p14="http://schemas.microsoft.com/office/powerpoint/2010/main" val="33994053"/>
       </p:ext>
     </p:extLst>
   </p:cSld>
@@ -9514,7 +10203,7 @@
           <a:p>
             <a:r>
               <a:rPr lang="en-US" dirty="0" smtClean="0"/>
-              <a:t>Description for the Card</a:t>
+              <a:t>Type of the Card</a:t>
             </a:r>
             <a:endParaRPr lang="en-US" dirty="0"/>
           </a:p>
@@ -9538,20 +10227,66 @@
               </a:ext>
             </a:extLst>
           </a:blip>
-          <a:srcRect l="6646" t="59991" r="3880" b="8249"/>
+          <a:srcRect l="5773" t="48699" r="27843" b="32245"/>
           <a:stretch/>
         </p:blipFill>
         <p:spPr>
           <a:xfrm>
-            <a:off x="2438400" y="2514599"/>
-            <a:ext cx="6858000" cy="3318387"/>
+            <a:off x="2819400" y="3200400"/>
+            <a:ext cx="7010400" cy="2743204"/>
           </a:xfrm>
         </p:spPr>
       </p:pic>
+      <p:sp>
+        <p:nvSpPr>
+          <p:cNvPr id="5" name="Rectangle 4"/>
+          <p:cNvSpPr/>
+          <p:nvPr/>
+        </p:nvSpPr>
+        <p:spPr>
+          <a:xfrm>
+            <a:off x="3352800" y="4343400"/>
+            <a:ext cx="5867400" cy="609600"/>
+          </a:xfrm>
+          <a:prstGeom prst="rect">
+            <a:avLst/>
+          </a:prstGeom>
+          <a:noFill/>
+          <a:ln w="57150">
+            <a:solidFill>
+              <a:srgbClr val="FF0000"/>
+            </a:solidFill>
+          </a:ln>
+        </p:spPr>
+        <p:style>
+          <a:lnRef idx="2">
+            <a:schemeClr val="accent1">
+              <a:shade val="50000"/>
+            </a:schemeClr>
+          </a:lnRef>
+          <a:fillRef idx="1">
+            <a:schemeClr val="accent1"/>
+          </a:fillRef>
+          <a:effectRef idx="0">
+            <a:schemeClr val="accent1"/>
+          </a:effectRef>
+          <a:fontRef idx="minor">
+            <a:schemeClr val="lt1"/>
+          </a:fontRef>
+        </p:style>
+        <p:txBody>
+          <a:bodyPr rtlCol="0" anchor="ctr"/>
+          <a:lstStyle/>
+          <a:p>
+            <a:pPr algn="ctr"/>
+            <a:endParaRPr lang="en-US"/>
+          </a:p>
+        </p:txBody>
+      </p:sp>
     </p:spTree>
     <p:extLst>
       <p:ext uri="{BB962C8B-B14F-4D97-AF65-F5344CB8AC3E}">
-        <p14:creationId xmlns:p14="http://schemas.microsoft.com/office/powerpoint/2010/main" val="3373117449"/>
+        <p14:creationId xmlns:p14="http://schemas.microsoft.com/office/powerpoint/2010/main" val="14985521"/>
       </p:ext>
     </p:extLst>
   </p:cSld>
@@ -9595,7 +10330,7 @@
           <a:p>
             <a:r>
               <a:rPr lang="en-US" dirty="0" smtClean="0"/>
-              <a:t>Attack and Defense of the Card</a:t>
+              <a:t>Set and Rarity of the Card</a:t>
             </a:r>
             <a:endParaRPr lang="en-US" dirty="0"/>
           </a:p>
@@ -9619,20 +10354,66 @@
               </a:ext>
             </a:extLst>
           </a:blip>
-          <a:srcRect l="67257" t="85399"/>
+          <a:srcRect l="75916" t="49404" b="33657"/>
           <a:stretch/>
         </p:blipFill>
         <p:spPr>
           <a:xfrm>
-            <a:off x="2997634" y="3048000"/>
-            <a:ext cx="4979234" cy="3026724"/>
+            <a:off x="3733800" y="2575080"/>
+            <a:ext cx="4038600" cy="3871977"/>
           </a:xfrm>
         </p:spPr>
       </p:pic>
+      <p:sp>
+        <p:nvSpPr>
+          <p:cNvPr id="5" name="Rectangle 4"/>
+          <p:cNvSpPr/>
+          <p:nvPr/>
+        </p:nvSpPr>
+        <p:spPr>
+          <a:xfrm>
+            <a:off x="5105400" y="4267200"/>
+            <a:ext cx="1447800" cy="990600"/>
+          </a:xfrm>
+          <a:prstGeom prst="rect">
+            <a:avLst/>
+          </a:prstGeom>
+          <a:noFill/>
+          <a:ln w="57150">
+            <a:solidFill>
+              <a:srgbClr val="FF0000"/>
+            </a:solidFill>
+          </a:ln>
+        </p:spPr>
+        <p:style>
+          <a:lnRef idx="2">
+            <a:schemeClr val="accent1">
+              <a:shade val="50000"/>
+            </a:schemeClr>
+          </a:lnRef>
+          <a:fillRef idx="1">
+            <a:schemeClr val="accent1"/>
+          </a:fillRef>
+          <a:effectRef idx="0">
+            <a:schemeClr val="accent1"/>
+          </a:effectRef>
+          <a:fontRef idx="minor">
+            <a:schemeClr val="lt1"/>
+          </a:fontRef>
+        </p:style>
+        <p:txBody>
+          <a:bodyPr rtlCol="0" anchor="ctr"/>
+          <a:lstStyle/>
+          <a:p>
+            <a:pPr algn="ctr"/>
+            <a:endParaRPr lang="en-US"/>
+          </a:p>
+        </p:txBody>
+      </p:sp>
     </p:spTree>
     <p:extLst>
       <p:ext uri="{BB962C8B-B14F-4D97-AF65-F5344CB8AC3E}">
-        <p14:creationId xmlns:p14="http://schemas.microsoft.com/office/powerpoint/2010/main" val="1617809523"/>
+        <p14:creationId xmlns:p14="http://schemas.microsoft.com/office/powerpoint/2010/main" val="1965856906"/>
       </p:ext>
     </p:extLst>
   </p:cSld>

</xml_diff>